<commit_message>
informação sobre implementação e especificação
</commit_message>
<xml_diff>
--- a/ppt_spring_jpa.pptx
+++ b/ppt_spring_jpa.pptx
@@ -5,10 +5,10 @@
     <p:sldMasterId id="2147483660" r:id="rId4"/>
   </p:sldMasterIdLst>
   <p:notesMasterIdLst>
-    <p:notesMasterId r:id="rId11"/>
+    <p:notesMasterId r:id="rId13"/>
   </p:notesMasterIdLst>
   <p:handoutMasterIdLst>
-    <p:handoutMasterId r:id="rId12"/>
+    <p:handoutMasterId r:id="rId14"/>
   </p:handoutMasterIdLst>
   <p:sldIdLst>
     <p:sldId id="257" r:id="rId5"/>
@@ -16,7 +16,9 @@
     <p:sldId id="274" r:id="rId7"/>
     <p:sldId id="275" r:id="rId8"/>
     <p:sldId id="276" r:id="rId9"/>
-    <p:sldId id="273" r:id="rId10"/>
+    <p:sldId id="277" r:id="rId10"/>
+    <p:sldId id="278" r:id="rId11"/>
+    <p:sldId id="273" r:id="rId12"/>
   </p:sldIdLst>
   <p:sldSz cx="12192000" cy="6858000"/>
   <p:notesSz cx="6858000" cy="9144000"/>
@@ -1150,6 +1152,174 @@
             <a:fld id="{9BCAC675-7F8E-41EF-826B-CC35F9060C99}" type="slidenum">
               <a:rPr lang="pt-BR" noProof="0" smtClean="0"/>
               <a:t>6</a:t>
+            </a:fld>
+            <a:endParaRPr lang="pt-BR" noProof="0"/>
+          </a:p>
+        </p:txBody>
+      </p:sp>
+    </p:spTree>
+    <p:extLst>
+      <p:ext uri="{BB962C8B-B14F-4D97-AF65-F5344CB8AC3E}">
+        <p14:creationId xmlns:p14="http://schemas.microsoft.com/office/powerpoint/2010/main" val="1863151573"/>
+      </p:ext>
+    </p:extLst>
+  </p:cSld>
+  <p:clrMapOvr>
+    <a:masterClrMapping/>
+  </p:clrMapOvr>
+</p:notes>
+</file>
+
+<file path=ppt/notesSlides/notesSlide7.xml><?xml version="1.0" encoding="utf-8"?>
+<p:notes xmlns:a="http://schemas.openxmlformats.org/drawingml/2006/main" xmlns:r="http://schemas.openxmlformats.org/officeDocument/2006/relationships" xmlns:p="http://schemas.openxmlformats.org/presentationml/2006/main">
+  <p:cSld>
+    <p:spTree>
+      <p:nvGrpSpPr>
+        <p:cNvPr id="1" name=""/>
+        <p:cNvGrpSpPr/>
+        <p:nvPr/>
+      </p:nvGrpSpPr>
+      <p:grpSpPr>
+        <a:xfrm>
+          <a:off x="0" y="0"/>
+          <a:ext cx="0" cy="0"/>
+          <a:chOff x="0" y="0"/>
+          <a:chExt cx="0" cy="0"/>
+        </a:xfrm>
+      </p:grpSpPr>
+      <p:sp>
+        <p:nvSpPr>
+          <p:cNvPr id="2" name="Espaço Reservado para Imagem de Slide 1"/>
+          <p:cNvSpPr>
+            <a:spLocks noGrp="1" noRot="1" noChangeAspect="1"/>
+          </p:cNvSpPr>
+          <p:nvPr>
+            <p:ph type="sldImg"/>
+          </p:nvPr>
+        </p:nvSpPr>
+        <p:spPr/>
+      </p:sp>
+      <p:sp>
+        <p:nvSpPr>
+          <p:cNvPr id="3" name="Espaço Reservado para Anotações 2"/>
+          <p:cNvSpPr>
+            <a:spLocks noGrp="1"/>
+          </p:cNvSpPr>
+          <p:nvPr>
+            <p:ph type="body" idx="1"/>
+          </p:nvPr>
+        </p:nvSpPr>
+        <p:spPr/>
+        <p:txBody>
+          <a:bodyPr/>
+          <a:lstStyle/>
+          <a:p>
+            <a:endParaRPr lang="pt-BR"/>
+          </a:p>
+        </p:txBody>
+      </p:sp>
+      <p:sp>
+        <p:nvSpPr>
+          <p:cNvPr id="4" name="Espaço Reservado para Número de Slide 3"/>
+          <p:cNvSpPr>
+            <a:spLocks noGrp="1"/>
+          </p:cNvSpPr>
+          <p:nvPr>
+            <p:ph type="sldNum" sz="quarter" idx="5"/>
+          </p:nvPr>
+        </p:nvSpPr>
+        <p:spPr/>
+        <p:txBody>
+          <a:bodyPr/>
+          <a:lstStyle/>
+          <a:p>
+            <a:fld id="{9BCAC675-7F8E-41EF-826B-CC35F9060C99}" type="slidenum">
+              <a:rPr lang="pt-BR" noProof="0" smtClean="0"/>
+              <a:t>7</a:t>
+            </a:fld>
+            <a:endParaRPr lang="pt-BR" noProof="0"/>
+          </a:p>
+        </p:txBody>
+      </p:sp>
+    </p:spTree>
+    <p:extLst>
+      <p:ext uri="{BB962C8B-B14F-4D97-AF65-F5344CB8AC3E}">
+        <p14:creationId xmlns:p14="http://schemas.microsoft.com/office/powerpoint/2010/main" val="1486553630"/>
+      </p:ext>
+    </p:extLst>
+  </p:cSld>
+  <p:clrMapOvr>
+    <a:masterClrMapping/>
+  </p:clrMapOvr>
+</p:notes>
+</file>
+
+<file path=ppt/notesSlides/notesSlide8.xml><?xml version="1.0" encoding="utf-8"?>
+<p:notes xmlns:a="http://schemas.openxmlformats.org/drawingml/2006/main" xmlns:r="http://schemas.openxmlformats.org/officeDocument/2006/relationships" xmlns:p="http://schemas.openxmlformats.org/presentationml/2006/main">
+  <p:cSld>
+    <p:spTree>
+      <p:nvGrpSpPr>
+        <p:cNvPr id="1" name=""/>
+        <p:cNvGrpSpPr/>
+        <p:nvPr/>
+      </p:nvGrpSpPr>
+      <p:grpSpPr>
+        <a:xfrm>
+          <a:off x="0" y="0"/>
+          <a:ext cx="0" cy="0"/>
+          <a:chOff x="0" y="0"/>
+          <a:chExt cx="0" cy="0"/>
+        </a:xfrm>
+      </p:grpSpPr>
+      <p:sp>
+        <p:nvSpPr>
+          <p:cNvPr id="2" name="Espaço Reservado para Imagem de Slide 1"/>
+          <p:cNvSpPr>
+            <a:spLocks noGrp="1" noRot="1" noChangeAspect="1"/>
+          </p:cNvSpPr>
+          <p:nvPr>
+            <p:ph type="sldImg"/>
+          </p:nvPr>
+        </p:nvSpPr>
+        <p:spPr/>
+      </p:sp>
+      <p:sp>
+        <p:nvSpPr>
+          <p:cNvPr id="3" name="Espaço Reservado para Anotações 2"/>
+          <p:cNvSpPr>
+            <a:spLocks noGrp="1"/>
+          </p:cNvSpPr>
+          <p:nvPr>
+            <p:ph type="body" idx="1"/>
+          </p:nvPr>
+        </p:nvSpPr>
+        <p:spPr/>
+        <p:txBody>
+          <a:bodyPr/>
+          <a:lstStyle/>
+          <a:p>
+            <a:endParaRPr lang="pt-BR"/>
+          </a:p>
+        </p:txBody>
+      </p:sp>
+      <p:sp>
+        <p:nvSpPr>
+          <p:cNvPr id="4" name="Espaço Reservado para Número de Slide 3"/>
+          <p:cNvSpPr>
+            <a:spLocks noGrp="1"/>
+          </p:cNvSpPr>
+          <p:nvPr>
+            <p:ph type="sldNum" sz="quarter" idx="5"/>
+          </p:nvPr>
+        </p:nvSpPr>
+        <p:spPr/>
+        <p:txBody>
+          <a:bodyPr/>
+          <a:lstStyle/>
+          <a:p>
+            <a:fld id="{9BCAC675-7F8E-41EF-826B-CC35F9060C99}" type="slidenum">
+              <a:rPr lang="pt-BR" noProof="0" smtClean="0"/>
+              <a:t>8</a:t>
             </a:fld>
             <a:endParaRPr lang="pt-BR" noProof="0"/>
           </a:p>
@@ -5426,46 +5596,46 @@
               </a:lnSpc>
             </a:pPr>
             <a:r>
-              <a:rPr lang="pt-BR" sz="2800" dirty="0" smtClean="0"/>
+              <a:rPr lang="pt-BR" sz="2400" dirty="0" smtClean="0"/>
               <a:t>O </a:t>
             </a:r>
             <a:r>
-              <a:rPr lang="pt-BR" sz="2800" b="1" dirty="0" smtClean="0"/>
+              <a:rPr lang="pt-BR" sz="2400" b="1" dirty="0" smtClean="0"/>
               <a:t>Spring</a:t>
             </a:r>
             <a:r>
-              <a:rPr lang="pt-BR" sz="2800" dirty="0" smtClean="0"/>
+              <a:rPr lang="pt-BR" sz="2400" dirty="0" smtClean="0"/>
               <a:t>, é um </a:t>
             </a:r>
             <a:r>
-              <a:rPr lang="pt-BR" sz="2800" b="1" dirty="0" smtClean="0"/>
+              <a:rPr lang="pt-BR" sz="2400" b="1" dirty="0" smtClean="0"/>
               <a:t>framework open </a:t>
             </a:r>
             <a:r>
-              <a:rPr lang="pt-BR" sz="2800" b="1" dirty="0" err="1" smtClean="0"/>
+              <a:rPr lang="pt-BR" sz="2400" b="1" dirty="0" err="1" smtClean="0"/>
               <a:t>source</a:t>
             </a:r>
             <a:r>
-              <a:rPr lang="pt-BR" sz="2800" dirty="0" smtClean="0"/>
+              <a:rPr lang="pt-BR" sz="2400" dirty="0" smtClean="0"/>
               <a:t>, ou seja, de código aberto, para a plataforma Java, criado por Rod Johnson. Trata-se de um framework </a:t>
             </a:r>
             <a:r>
-              <a:rPr lang="pt-BR" sz="2800" b="1" dirty="0" smtClean="0"/>
+              <a:rPr lang="pt-BR" sz="2400" b="1" dirty="0" smtClean="0"/>
               <a:t>não intrusivo</a:t>
             </a:r>
             <a:r>
-              <a:rPr lang="pt-BR" sz="2800" dirty="0" smtClean="0"/>
+              <a:rPr lang="pt-BR" sz="2400" dirty="0" smtClean="0"/>
               <a:t>, baseado nos padrões de projeto inversão de controle (</a:t>
             </a:r>
             <a:r>
-              <a:rPr lang="pt-BR" sz="2800" dirty="0" err="1" smtClean="0"/>
+              <a:rPr lang="pt-BR" sz="2400" dirty="0" err="1" smtClean="0"/>
               <a:t>IoC</a:t>
             </a:r>
             <a:r>
-              <a:rPr lang="pt-BR" sz="2800" dirty="0" smtClean="0"/>
+              <a:rPr lang="pt-BR" sz="2400" dirty="0" smtClean="0"/>
               <a:t>) e injeção de dependência</a:t>
             </a:r>
-            <a:endParaRPr lang="pt-BR" sz="2800" dirty="0"/>
+            <a:endParaRPr lang="pt-BR" sz="2400" dirty="0"/>
           </a:p>
         </p:txBody>
       </p:sp>
@@ -5681,7 +5851,7 @@
         <p:spPr>
           <a:xfrm>
             <a:off x="478095" y="1150891"/>
-            <a:ext cx="3602726" cy="1975060"/>
+            <a:ext cx="3602726" cy="1383762"/>
           </a:xfrm>
         </p:spPr>
         <p:txBody>
@@ -5811,27 +5981,27 @@
               </a:lnSpc>
             </a:pPr>
             <a:r>
-              <a:rPr lang="pt-BR" sz="2800" b="1" dirty="0" smtClean="0"/>
+              <a:rPr lang="pt-BR" sz="2400" b="1" dirty="0" smtClean="0"/>
               <a:t>Existem mais de 20 frameworks Spring, mas cada um deles tem a sua utilidade dentro do sistema! </a:t>
             </a:r>
             <a:r>
-              <a:rPr lang="pt-BR" sz="2800" dirty="0" smtClean="0"/>
+              <a:rPr lang="pt-BR" sz="2400" dirty="0" smtClean="0"/>
               <a:t>Segue alguns principais: Spring Boot, Spring Data JPA, </a:t>
             </a:r>
             <a:r>
-              <a:rPr lang="pt-BR" sz="2800" dirty="0"/>
+              <a:rPr lang="pt-BR" sz="2400" dirty="0"/>
               <a:t>Spring </a:t>
             </a:r>
             <a:r>
-              <a:rPr lang="pt-BR" sz="2800" dirty="0" smtClean="0"/>
+              <a:rPr lang="pt-BR" sz="2400" dirty="0" smtClean="0"/>
               <a:t>Security, </a:t>
             </a:r>
             <a:r>
-              <a:rPr lang="pt-BR" sz="2800" dirty="0"/>
+              <a:rPr lang="pt-BR" sz="2400" dirty="0"/>
               <a:t>Spring </a:t>
             </a:r>
             <a:r>
-              <a:rPr lang="pt-BR" sz="2800" dirty="0" smtClean="0"/>
+              <a:rPr lang="pt-BR" sz="2400" dirty="0" smtClean="0"/>
               <a:t>MVC, </a:t>
             </a:r>
           </a:p>
@@ -5842,27 +6012,27 @@
               </a:lnSpc>
             </a:pPr>
             <a:r>
-              <a:rPr lang="pt-BR" sz="2800" dirty="0" smtClean="0"/>
+              <a:rPr lang="pt-BR" sz="2400" dirty="0" smtClean="0"/>
               <a:t>Spring Web </a:t>
             </a:r>
             <a:r>
-              <a:rPr lang="pt-BR" sz="2800" dirty="0" err="1" smtClean="0"/>
+              <a:rPr lang="pt-BR" sz="2400" dirty="0" err="1" smtClean="0"/>
               <a:t>Flow</a:t>
             </a:r>
             <a:r>
-              <a:rPr lang="pt-BR" sz="2800" dirty="0" smtClean="0"/>
+              <a:rPr lang="pt-BR" sz="2400" dirty="0" smtClean="0"/>
               <a:t>, </a:t>
             </a:r>
             <a:r>
-              <a:rPr lang="pt-BR" sz="2800" dirty="0"/>
+              <a:rPr lang="pt-BR" sz="2400" dirty="0"/>
               <a:t>Spring </a:t>
             </a:r>
             <a:r>
-              <a:rPr lang="pt-BR" sz="2800" dirty="0" err="1" smtClean="0"/>
+              <a:rPr lang="pt-BR" sz="2400" dirty="0" err="1" smtClean="0"/>
               <a:t>Cloud</a:t>
             </a:r>
             <a:r>
-              <a:rPr lang="pt-BR" sz="2800" dirty="0" smtClean="0"/>
+              <a:rPr lang="pt-BR" sz="2400" dirty="0" smtClean="0"/>
               <a:t>, </a:t>
             </a:r>
           </a:p>
@@ -5873,10 +6043,10 @@
               </a:lnSpc>
             </a:pPr>
             <a:r>
-              <a:rPr lang="pt-BR" sz="2800" dirty="0" smtClean="0"/>
+              <a:rPr lang="pt-BR" sz="2400" dirty="0" smtClean="0"/>
               <a:t>Spring Batch</a:t>
             </a:r>
-            <a:endParaRPr lang="pt-BR" sz="2800" dirty="0"/>
+            <a:endParaRPr lang="pt-BR" sz="2400" dirty="0"/>
           </a:p>
         </p:txBody>
       </p:sp>
@@ -6095,7 +6265,7 @@
         <p:spPr>
           <a:xfrm>
             <a:off x="478095" y="1150891"/>
-            <a:ext cx="3602726" cy="1975060"/>
+            <a:ext cx="3602726" cy="1367720"/>
           </a:xfrm>
         </p:spPr>
         <p:txBody>
@@ -6225,18 +6395,18 @@
               </a:lnSpc>
             </a:pPr>
             <a:r>
-              <a:rPr lang="pt-BR" sz="2800" dirty="0" smtClean="0"/>
+              <a:rPr lang="pt-BR" sz="2400" dirty="0" smtClean="0"/>
               <a:t>Ele é um Projeto que está dentro do    Ecossistema Spring que ajuda a criar aplicações stand-</a:t>
             </a:r>
             <a:r>
-              <a:rPr lang="pt-BR" sz="2800" dirty="0" err="1" smtClean="0"/>
+              <a:rPr lang="pt-BR" sz="2400" dirty="0" err="1" smtClean="0"/>
               <a:t>alone</a:t>
             </a:r>
             <a:r>
-              <a:rPr lang="pt-BR" sz="2800" dirty="0" smtClean="0"/>
+              <a:rPr lang="pt-BR" sz="2400" dirty="0" smtClean="0"/>
               <a:t>, ou seja, aplicações que funcionam por conta própria. Para isso, é essencial que você tenha o Java instalado na sua máquina. </a:t>
             </a:r>
-            <a:endParaRPr lang="pt-BR" sz="2800" dirty="0"/>
+            <a:endParaRPr lang="pt-BR" sz="2400" dirty="0"/>
           </a:p>
         </p:txBody>
       </p:sp>
@@ -6429,7 +6599,7 @@
           <a:lstStyle/>
           <a:p>
             <a:pPr algn="ctr" rtl="0"/>
-            <a:endParaRPr lang="pt-BR" u="sng" dirty="0"/>
+            <a:endParaRPr lang="pt-BR" dirty="0"/>
           </a:p>
         </p:txBody>
       </p:sp>
@@ -6451,7 +6621,7 @@
         </p:nvSpPr>
         <p:spPr>
           <a:xfrm>
-            <a:off x="905800" y="1150891"/>
+            <a:off x="874673" y="830049"/>
             <a:ext cx="2265105" cy="1442789"/>
           </a:xfrm>
         </p:spPr>
@@ -6554,6 +6724,795 @@
           <a:xfrm>
             <a:off x="5180606" y="818147"/>
             <a:ext cx="6401793" cy="5694948"/>
+          </a:xfrm>
+          <a:prstGeom prst="rect">
+            <a:avLst/>
+          </a:prstGeom>
+        </p:spPr>
+        <p:txBody>
+          <a:bodyPr vert="horz" lIns="91440" tIns="45720" rIns="91440" bIns="45720" rtlCol="0" anchor="t">
+            <a:normAutofit/>
+          </a:bodyPr>
+          <a:lstStyle>
+            <a:lvl1pPr algn="l" defTabSz="914400" rtl="0" eaLnBrk="1" latinLnBrk="0" hangingPunct="1">
+              <a:lnSpc>
+                <a:spcPct val="89000"/>
+              </a:lnSpc>
+              <a:spcBef>
+                <a:spcPct val="0"/>
+              </a:spcBef>
+              <a:buNone/>
+              <a:defRPr sz="4400" kern="1200" baseline="0">
+                <a:solidFill>
+                  <a:schemeClr val="tx2"/>
+                </a:solidFill>
+                <a:latin typeface="+mj-lt"/>
+                <a:ea typeface="+mj-ea"/>
+                <a:cs typeface="+mj-cs"/>
+              </a:defRPr>
+            </a:lvl1pPr>
+          </a:lstStyle>
+          <a:p>
+            <a:pPr>
+              <a:lnSpc>
+                <a:spcPct val="150000"/>
+              </a:lnSpc>
+            </a:pPr>
+            <a:r>
+              <a:rPr lang="pt-BR" sz="2400" dirty="0" smtClean="0"/>
+              <a:t>Inicialmente quando começamos um projeto, precisamos realizar diversas configurações da aplicação. Isso leva um tempo, dessa forma o Spring Boot vem para facilitar este processo. Com ele o projeto é criado com todas as configurações necessárias. Ajuda na performance do desenvolver e facilitar na hora do </a:t>
+            </a:r>
+            <a:r>
+              <a:rPr lang="pt-BR" sz="2400" dirty="0" err="1" smtClean="0"/>
+              <a:t>deploy</a:t>
+            </a:r>
+            <a:r>
+              <a:rPr lang="pt-BR" sz="2400" dirty="0" smtClean="0"/>
+              <a:t>.</a:t>
+            </a:r>
+            <a:endParaRPr lang="pt-BR" sz="2400" dirty="0"/>
+          </a:p>
+        </p:txBody>
+      </p:sp>
+      <p:sp>
+        <p:nvSpPr>
+          <p:cNvPr id="4" name="Retângulo 3"/>
+          <p:cNvSpPr/>
+          <p:nvPr/>
+        </p:nvSpPr>
+        <p:spPr>
+          <a:xfrm>
+            <a:off x="874673" y="2355953"/>
+            <a:ext cx="2327358" cy="2427498"/>
+          </a:xfrm>
+          <a:prstGeom prst="rect">
+            <a:avLst/>
+          </a:prstGeom>
+          <a:solidFill>
+            <a:srgbClr val="92D050"/>
+          </a:solidFill>
+          <a:ln>
+            <a:noFill/>
+          </a:ln>
+        </p:spPr>
+        <p:style>
+          <a:lnRef idx="2">
+            <a:schemeClr val="accent1">
+              <a:shade val="50000"/>
+            </a:schemeClr>
+          </a:lnRef>
+          <a:fillRef idx="1">
+            <a:schemeClr val="accent1"/>
+          </a:fillRef>
+          <a:effectRef idx="0">
+            <a:schemeClr val="accent1"/>
+          </a:effectRef>
+          <a:fontRef idx="minor">
+            <a:schemeClr val="lt1"/>
+          </a:fontRef>
+        </p:style>
+        <p:txBody>
+          <a:bodyPr rtlCol="0" anchor="ctr"/>
+          <a:lstStyle/>
+          <a:p>
+            <a:pPr algn="ctr"/>
+            <a:endParaRPr lang="pt-BR"/>
+          </a:p>
+        </p:txBody>
+      </p:sp>
+      <p:pic>
+        <p:nvPicPr>
+          <p:cNvPr id="3" name="Imagem 2"/>
+          <p:cNvPicPr>
+            <a:picLocks noChangeAspect="1"/>
+          </p:cNvPicPr>
+          <p:nvPr/>
+        </p:nvPicPr>
+        <p:blipFill>
+          <a:blip r:embed="rId3">
+            <a:extLst>
+              <a:ext uri="{28A0092B-C50C-407E-A947-70E740481C1C}">
+                <a14:useLocalDpi xmlns:a14="http://schemas.microsoft.com/office/drawing/2010/main" val="0"/>
+              </a:ext>
+            </a:extLst>
+          </a:blip>
+          <a:stretch>
+            <a:fillRect/>
+          </a:stretch>
+        </p:blipFill>
+        <p:spPr>
+          <a:xfrm>
+            <a:off x="706695" y="2272838"/>
+            <a:ext cx="2708526" cy="2708526"/>
+          </a:xfrm>
+          <a:prstGeom prst="rect">
+            <a:avLst/>
+          </a:prstGeom>
+        </p:spPr>
+      </p:pic>
+    </p:spTree>
+    <p:extLst>
+      <p:ext uri="{BB962C8B-B14F-4D97-AF65-F5344CB8AC3E}">
+        <p14:creationId xmlns:p14="http://schemas.microsoft.com/office/powerpoint/2010/main" val="3500495708"/>
+      </p:ext>
+    </p:extLst>
+  </p:cSld>
+  <p:clrMapOvr>
+    <a:masterClrMapping/>
+  </p:clrMapOvr>
+  <p:timing>
+    <p:tnLst>
+      <p:par>
+        <p:cTn id="1" dur="indefinite" restart="never" nodeType="tmRoot"/>
+      </p:par>
+    </p:tnLst>
+  </p:timing>
+</p:sld>
+</file>
+
+<file path=ppt/slides/slide6.xml><?xml version="1.0" encoding="utf-8"?>
+<p:sld xmlns:a="http://schemas.openxmlformats.org/drawingml/2006/main" xmlns:r="http://schemas.openxmlformats.org/officeDocument/2006/relationships" xmlns:p="http://schemas.openxmlformats.org/presentationml/2006/main">
+  <p:cSld>
+    <p:bg>
+      <p:bgPr>
+        <a:solidFill>
+          <a:srgbClr val="92D050"/>
+        </a:solidFill>
+        <a:effectLst/>
+      </p:bgPr>
+    </p:bg>
+    <p:spTree>
+      <p:nvGrpSpPr>
+        <p:cNvPr id="1" name=""/>
+        <p:cNvGrpSpPr/>
+        <p:nvPr/>
+      </p:nvGrpSpPr>
+      <p:grpSpPr>
+        <a:xfrm>
+          <a:off x="0" y="0"/>
+          <a:ext cx="0" cy="0"/>
+          <a:chOff x="0" y="0"/>
+          <a:chExt cx="0" cy="0"/>
+        </a:xfrm>
+      </p:grpSpPr>
+      <p:sp>
+        <p:nvSpPr>
+          <p:cNvPr id="110" name="Retângulo 109">
+            <a:extLst>
+              <a:ext uri="{FF2B5EF4-FFF2-40B4-BE49-F238E27FC236}">
+                <a16:creationId xmlns:a16="http://schemas.microsoft.com/office/drawing/2014/main" xmlns="" id="{0E807223-DF88-4D6D-970E-08919E5E02EB}"/>
+              </a:ext>
+              <a:ext uri="{C183D7F6-B498-43B3-948B-1728B52AA6E4}">
+                <adec:decorative xmlns:adec="http://schemas.microsoft.com/office/drawing/2017/decorative" xmlns="" val="1"/>
+              </a:ext>
+            </a:extLst>
+          </p:cNvPr>
+          <p:cNvSpPr>
+            <a:spLocks noGrp="1" noRot="1" noChangeAspect="1" noMove="1" noResize="1" noEditPoints="1" noAdjustHandles="1" noChangeArrowheads="1" noChangeShapeType="1" noTextEdit="1"/>
+          </p:cNvSpPr>
+          <p:nvPr>
+            <p:extLst>
+              <p:ext uri="{386F3935-93C4-4BCD-93E2-E3B085C9AB24}">
+                <p16:designElem xmlns:p16="http://schemas.microsoft.com/office/powerpoint/2015/main" xmlns="" val="1"/>
+              </p:ext>
+            </p:extLst>
+          </p:nvPr>
+        </p:nvSpPr>
+        <p:spPr>
+          <a:xfrm>
+            <a:off x="478095" y="376"/>
+            <a:ext cx="228600" cy="6858000"/>
+          </a:xfrm>
+          <a:prstGeom prst="rect">
+            <a:avLst/>
+          </a:prstGeom>
+          <a:solidFill>
+            <a:schemeClr val="tx2"/>
+          </a:solidFill>
+          <a:ln>
+            <a:noFill/>
+          </a:ln>
+        </p:spPr>
+        <p:style>
+          <a:lnRef idx="2">
+            <a:schemeClr val="accent1">
+              <a:shade val="50000"/>
+            </a:schemeClr>
+          </a:lnRef>
+          <a:fillRef idx="1">
+            <a:schemeClr val="accent1"/>
+          </a:fillRef>
+          <a:effectRef idx="0">
+            <a:schemeClr val="accent1"/>
+          </a:effectRef>
+          <a:fontRef idx="minor">
+            <a:schemeClr val="lt1"/>
+          </a:fontRef>
+        </p:style>
+      </p:sp>
+      <p:sp>
+        <p:nvSpPr>
+          <p:cNvPr id="112" name="Retângulo 111">
+            <a:extLst>
+              <a:ext uri="{FF2B5EF4-FFF2-40B4-BE49-F238E27FC236}">
+                <a16:creationId xmlns:a16="http://schemas.microsoft.com/office/drawing/2014/main" xmlns="" id="{83B91B61-BFCA-4647-957E-A8269BE46F39}"/>
+              </a:ext>
+              <a:ext uri="{C183D7F6-B498-43B3-948B-1728B52AA6E4}">
+                <adec:decorative xmlns:adec="http://schemas.microsoft.com/office/drawing/2017/decorative" xmlns="" val="1"/>
+              </a:ext>
+            </a:extLst>
+          </p:cNvPr>
+          <p:cNvSpPr>
+            <a:spLocks noGrp="1" noRot="1" noChangeAspect="1" noMove="1" noResize="1" noEditPoints="1" noAdjustHandles="1" noChangeArrowheads="1" noChangeShapeType="1" noTextEdit="1"/>
+          </p:cNvSpPr>
+          <p:nvPr>
+            <p:extLst>
+              <p:ext uri="{386F3935-93C4-4BCD-93E2-E3B085C9AB24}">
+                <p16:designElem xmlns:p16="http://schemas.microsoft.com/office/powerpoint/2015/main" xmlns="" val="1"/>
+              </p:ext>
+            </p:extLst>
+          </p:nvPr>
+        </p:nvSpPr>
+        <p:spPr>
+          <a:xfrm>
+            <a:off x="0" y="0"/>
+            <a:ext cx="12192000" cy="6858000"/>
+          </a:xfrm>
+          <a:prstGeom prst="rect">
+            <a:avLst/>
+          </a:prstGeom>
+          <a:solidFill>
+            <a:schemeClr val="bg1"/>
+          </a:solidFill>
+          <a:ln>
+            <a:noFill/>
+          </a:ln>
+        </p:spPr>
+        <p:style>
+          <a:lnRef idx="2">
+            <a:schemeClr val="accent1">
+              <a:shade val="50000"/>
+            </a:schemeClr>
+          </a:lnRef>
+          <a:fillRef idx="1">
+            <a:schemeClr val="accent1"/>
+          </a:fillRef>
+          <a:effectRef idx="0">
+            <a:schemeClr val="accent1"/>
+          </a:effectRef>
+          <a:fontRef idx="minor">
+            <a:schemeClr val="lt1"/>
+          </a:fontRef>
+        </p:style>
+        <p:txBody>
+          <a:bodyPr rtlCol="0" anchor="ctr"/>
+          <a:lstStyle/>
+          <a:p>
+            <a:pPr algn="ctr" rtl="0"/>
+            <a:endParaRPr lang="pt-BR" dirty="0"/>
+          </a:p>
+        </p:txBody>
+      </p:sp>
+      <p:sp>
+        <p:nvSpPr>
+          <p:cNvPr id="11" name="Retângulo 10">
+            <a:extLst>
+              <a:ext uri="{FF2B5EF4-FFF2-40B4-BE49-F238E27FC236}">
+                <a16:creationId xmlns:a16="http://schemas.microsoft.com/office/drawing/2014/main" xmlns="" id="{92D1D7C6-1C89-420C-8D35-483654167118}"/>
+              </a:ext>
+              <a:ext uri="{C183D7F6-B498-43B3-948B-1728B52AA6E4}">
+                <adec:decorative xmlns:adec="http://schemas.microsoft.com/office/drawing/2017/decorative" xmlns="" val="1"/>
+              </a:ext>
+            </a:extLst>
+          </p:cNvPr>
+          <p:cNvSpPr>
+            <a:spLocks noGrp="1" noRot="1" noChangeAspect="1" noMove="1" noResize="1" noEditPoints="1" noAdjustHandles="1" noChangeArrowheads="1" noChangeShapeType="1" noTextEdit="1"/>
+          </p:cNvSpPr>
+          <p:nvPr>
+            <p:extLst>
+              <p:ext uri="{386F3935-93C4-4BCD-93E2-E3B085C9AB24}">
+                <p16:designElem xmlns:p16="http://schemas.microsoft.com/office/powerpoint/2015/main" xmlns="" val="1"/>
+              </p:ext>
+            </p:extLst>
+          </p:nvPr>
+        </p:nvSpPr>
+        <p:spPr>
+          <a:xfrm>
+            <a:off x="4373545" y="376"/>
+            <a:ext cx="228600" cy="6858000"/>
+          </a:xfrm>
+          <a:prstGeom prst="rect">
+            <a:avLst/>
+          </a:prstGeom>
+          <a:solidFill>
+            <a:schemeClr val="tx2"/>
+          </a:solidFill>
+          <a:ln>
+            <a:noFill/>
+          </a:ln>
+        </p:spPr>
+        <p:style>
+          <a:lnRef idx="2">
+            <a:schemeClr val="accent1">
+              <a:shade val="50000"/>
+            </a:schemeClr>
+          </a:lnRef>
+          <a:fillRef idx="1">
+            <a:schemeClr val="accent1"/>
+          </a:fillRef>
+          <a:effectRef idx="0">
+            <a:schemeClr val="accent1"/>
+          </a:effectRef>
+          <a:fontRef idx="minor">
+            <a:schemeClr val="lt1"/>
+          </a:fontRef>
+        </p:style>
+      </p:sp>
+      <p:sp>
+        <p:nvSpPr>
+          <p:cNvPr id="13" name="Título 1">
+            <a:extLst>
+              <a:ext uri="{FF2B5EF4-FFF2-40B4-BE49-F238E27FC236}">
+                <a16:creationId xmlns:a16="http://schemas.microsoft.com/office/drawing/2014/main" xmlns="" id="{23F6D5E8-15CF-4755-910B-1B5A1E777357}"/>
+              </a:ext>
+            </a:extLst>
+          </p:cNvPr>
+          <p:cNvSpPr txBox="1">
+            <a:spLocks/>
+          </p:cNvSpPr>
+          <p:nvPr/>
+        </p:nvSpPr>
+        <p:spPr>
+          <a:xfrm>
+            <a:off x="4891376" y="416208"/>
+            <a:ext cx="6947698" cy="6273349"/>
+          </a:xfrm>
+          <a:prstGeom prst="rect">
+            <a:avLst/>
+          </a:prstGeom>
+        </p:spPr>
+        <p:txBody>
+          <a:bodyPr vert="horz" lIns="91440" tIns="45720" rIns="91440" bIns="45720" rtlCol="0" anchor="t">
+            <a:normAutofit/>
+          </a:bodyPr>
+          <a:lstStyle>
+            <a:lvl1pPr algn="l" defTabSz="914400" rtl="0" eaLnBrk="1" latinLnBrk="0" hangingPunct="1">
+              <a:lnSpc>
+                <a:spcPct val="89000"/>
+              </a:lnSpc>
+              <a:spcBef>
+                <a:spcPct val="0"/>
+              </a:spcBef>
+              <a:buNone/>
+              <a:defRPr sz="4400" kern="1200" baseline="0">
+                <a:solidFill>
+                  <a:schemeClr val="tx2"/>
+                </a:solidFill>
+                <a:latin typeface="+mj-lt"/>
+                <a:ea typeface="+mj-ea"/>
+                <a:cs typeface="+mj-cs"/>
+              </a:defRPr>
+            </a:lvl1pPr>
+          </a:lstStyle>
+          <a:p>
+            <a:pPr>
+              <a:lnSpc>
+                <a:spcPct val="150000"/>
+              </a:lnSpc>
+            </a:pPr>
+            <a:r>
+              <a:rPr lang="pt-BR" sz="2400" dirty="0" smtClean="0"/>
+              <a:t>Java </a:t>
+            </a:r>
+            <a:r>
+              <a:rPr lang="pt-BR" sz="2400" dirty="0" err="1" smtClean="0"/>
+              <a:t>Persistence</a:t>
+            </a:r>
+            <a:r>
+              <a:rPr lang="pt-BR" sz="2400" dirty="0" smtClean="0"/>
+              <a:t> API, é uma especificação que descreve como deve ser o comportamento dos frameworks de persistência Java. Por ser uma especificação ele a JPA não tem possui código de execução. Mesmo não sendo executável, a </a:t>
+            </a:r>
+            <a:r>
+              <a:rPr lang="pt-BR" sz="2400" dirty="0"/>
+              <a:t>especificação possui algumas classes, interfaces e anotações </a:t>
+            </a:r>
+            <a:r>
+              <a:rPr lang="pt-BR" sz="2400" dirty="0" smtClean="0"/>
+              <a:t>que ajudam </a:t>
+            </a:r>
+            <a:r>
+              <a:rPr lang="pt-BR" sz="2400" dirty="0"/>
+              <a:t>o desenvolvedor a abstrair o código</a:t>
+            </a:r>
+            <a:r>
+              <a:rPr lang="pt-BR" sz="2400" dirty="0" smtClean="0"/>
+              <a:t>. Dentro da dependência do pacote “</a:t>
+            </a:r>
+            <a:r>
+              <a:rPr lang="pt-BR" sz="2400" dirty="0" err="1" smtClean="0"/>
+              <a:t>javax.persistence</a:t>
+            </a:r>
+            <a:r>
+              <a:rPr lang="pt-BR" sz="2400" dirty="0" smtClean="0"/>
+              <a:t>”, ela ajuda a manter o código independente das implementações das especificações.</a:t>
+            </a:r>
+            <a:endParaRPr lang="pt-BR" sz="2400" dirty="0"/>
+          </a:p>
+        </p:txBody>
+      </p:sp>
+      <p:sp>
+        <p:nvSpPr>
+          <p:cNvPr id="12" name="Título 1">
+            <a:extLst>
+              <a:ext uri="{FF2B5EF4-FFF2-40B4-BE49-F238E27FC236}">
+                <a16:creationId xmlns:a16="http://schemas.microsoft.com/office/drawing/2014/main" xmlns="" id="{23F6D5E8-15CF-4755-910B-1B5A1E777357}"/>
+              </a:ext>
+            </a:extLst>
+          </p:cNvPr>
+          <p:cNvSpPr>
+            <a:spLocks noGrp="1"/>
+          </p:cNvSpPr>
+          <p:nvPr>
+            <p:ph type="title"/>
+          </p:nvPr>
+        </p:nvSpPr>
+        <p:spPr>
+          <a:xfrm>
+            <a:off x="340377" y="993725"/>
+            <a:ext cx="3743937" cy="1422779"/>
+          </a:xfrm>
+        </p:spPr>
+        <p:txBody>
+          <a:bodyPr vert="horz" lIns="91440" tIns="45720" rIns="91440" bIns="45720" rtlCol="0" anchor="t">
+            <a:noAutofit/>
+          </a:bodyPr>
+          <a:lstStyle/>
+          <a:p>
+            <a:pPr rtl="0">
+              <a:lnSpc>
+                <a:spcPct val="100000"/>
+              </a:lnSpc>
+            </a:pPr>
+            <a:r>
+              <a:rPr lang="pt-BR" sz="4000" b="1" dirty="0" smtClean="0"/>
+              <a:t>O que é JPA?</a:t>
+            </a:r>
+            <a:endParaRPr lang="pt-BR" sz="4000" b="1" dirty="0"/>
+          </a:p>
+        </p:txBody>
+      </p:sp>
+      <p:sp>
+        <p:nvSpPr>
+          <p:cNvPr id="16" name="Retângulo 15"/>
+          <p:cNvSpPr/>
+          <p:nvPr/>
+        </p:nvSpPr>
+        <p:spPr>
+          <a:xfrm>
+            <a:off x="874673" y="2355953"/>
+            <a:ext cx="2327358" cy="2427498"/>
+          </a:xfrm>
+          <a:prstGeom prst="rect">
+            <a:avLst/>
+          </a:prstGeom>
+          <a:solidFill>
+            <a:srgbClr val="92D050"/>
+          </a:solidFill>
+          <a:ln>
+            <a:noFill/>
+          </a:ln>
+        </p:spPr>
+        <p:style>
+          <a:lnRef idx="2">
+            <a:schemeClr val="accent1">
+              <a:shade val="50000"/>
+            </a:schemeClr>
+          </a:lnRef>
+          <a:fillRef idx="1">
+            <a:schemeClr val="accent1"/>
+          </a:fillRef>
+          <a:effectRef idx="0">
+            <a:schemeClr val="accent1"/>
+          </a:effectRef>
+          <a:fontRef idx="minor">
+            <a:schemeClr val="lt1"/>
+          </a:fontRef>
+        </p:style>
+        <p:txBody>
+          <a:bodyPr rtlCol="0" anchor="ctr"/>
+          <a:lstStyle/>
+          <a:p>
+            <a:pPr algn="ctr"/>
+            <a:endParaRPr lang="pt-BR"/>
+          </a:p>
+        </p:txBody>
+      </p:sp>
+      <p:pic>
+        <p:nvPicPr>
+          <p:cNvPr id="17" name="Imagem 16"/>
+          <p:cNvPicPr>
+            <a:picLocks noChangeAspect="1"/>
+          </p:cNvPicPr>
+          <p:nvPr/>
+        </p:nvPicPr>
+        <p:blipFill>
+          <a:blip r:embed="rId3">
+            <a:extLst>
+              <a:ext uri="{28A0092B-C50C-407E-A947-70E740481C1C}">
+                <a14:useLocalDpi xmlns:a14="http://schemas.microsoft.com/office/drawing/2010/main" val="0"/>
+              </a:ext>
+            </a:extLst>
+          </a:blip>
+          <a:stretch>
+            <a:fillRect/>
+          </a:stretch>
+        </p:blipFill>
+        <p:spPr>
+          <a:xfrm>
+            <a:off x="706695" y="2272838"/>
+            <a:ext cx="2708526" cy="2708526"/>
+          </a:xfrm>
+          <a:prstGeom prst="rect">
+            <a:avLst/>
+          </a:prstGeom>
+        </p:spPr>
+      </p:pic>
+    </p:spTree>
+    <p:extLst>
+      <p:ext uri="{BB962C8B-B14F-4D97-AF65-F5344CB8AC3E}">
+        <p14:creationId xmlns:p14="http://schemas.microsoft.com/office/powerpoint/2010/main" val="1543542106"/>
+      </p:ext>
+    </p:extLst>
+  </p:cSld>
+  <p:clrMapOvr>
+    <a:masterClrMapping/>
+  </p:clrMapOvr>
+  <p:timing>
+    <p:tnLst>
+      <p:par>
+        <p:cTn id="1" dur="indefinite" restart="never" nodeType="tmRoot"/>
+      </p:par>
+    </p:tnLst>
+  </p:timing>
+</p:sld>
+</file>
+
+<file path=ppt/slides/slide7.xml><?xml version="1.0" encoding="utf-8"?>
+<p:sld xmlns:a="http://schemas.openxmlformats.org/drawingml/2006/main" xmlns:r="http://schemas.openxmlformats.org/officeDocument/2006/relationships" xmlns:p="http://schemas.openxmlformats.org/presentationml/2006/main">
+  <p:cSld>
+    <p:bg>
+      <p:bgPr>
+        <a:solidFill>
+          <a:srgbClr val="92D050"/>
+        </a:solidFill>
+        <a:effectLst/>
+      </p:bgPr>
+    </p:bg>
+    <p:spTree>
+      <p:nvGrpSpPr>
+        <p:cNvPr id="1" name=""/>
+        <p:cNvGrpSpPr/>
+        <p:nvPr/>
+      </p:nvGrpSpPr>
+      <p:grpSpPr>
+        <a:xfrm>
+          <a:off x="0" y="0"/>
+          <a:ext cx="0" cy="0"/>
+          <a:chOff x="0" y="0"/>
+          <a:chExt cx="0" cy="0"/>
+        </a:xfrm>
+      </p:grpSpPr>
+      <p:sp>
+        <p:nvSpPr>
+          <p:cNvPr id="110" name="Retângulo 109">
+            <a:extLst>
+              <a:ext uri="{FF2B5EF4-FFF2-40B4-BE49-F238E27FC236}">
+                <a16:creationId xmlns:a16="http://schemas.microsoft.com/office/drawing/2014/main" xmlns="" id="{0E807223-DF88-4D6D-970E-08919E5E02EB}"/>
+              </a:ext>
+              <a:ext uri="{C183D7F6-B498-43B3-948B-1728B52AA6E4}">
+                <adec:decorative xmlns:adec="http://schemas.microsoft.com/office/drawing/2017/decorative" xmlns="" val="1"/>
+              </a:ext>
+            </a:extLst>
+          </p:cNvPr>
+          <p:cNvSpPr>
+            <a:spLocks noGrp="1" noRot="1" noChangeAspect="1" noMove="1" noResize="1" noEditPoints="1" noAdjustHandles="1" noChangeArrowheads="1" noChangeShapeType="1" noTextEdit="1"/>
+          </p:cNvSpPr>
+          <p:nvPr>
+            <p:extLst>
+              <p:ext uri="{386F3935-93C4-4BCD-93E2-E3B085C9AB24}">
+                <p16:designElem xmlns:p16="http://schemas.microsoft.com/office/powerpoint/2015/main" xmlns="" val="1"/>
+              </p:ext>
+            </p:extLst>
+          </p:nvPr>
+        </p:nvSpPr>
+        <p:spPr>
+          <a:xfrm>
+            <a:off x="478095" y="376"/>
+            <a:ext cx="228600" cy="6858000"/>
+          </a:xfrm>
+          <a:prstGeom prst="rect">
+            <a:avLst/>
+          </a:prstGeom>
+          <a:solidFill>
+            <a:schemeClr val="tx2"/>
+          </a:solidFill>
+          <a:ln>
+            <a:noFill/>
+          </a:ln>
+        </p:spPr>
+        <p:style>
+          <a:lnRef idx="2">
+            <a:schemeClr val="accent1">
+              <a:shade val="50000"/>
+            </a:schemeClr>
+          </a:lnRef>
+          <a:fillRef idx="1">
+            <a:schemeClr val="accent1"/>
+          </a:fillRef>
+          <a:effectRef idx="0">
+            <a:schemeClr val="accent1"/>
+          </a:effectRef>
+          <a:fontRef idx="minor">
+            <a:schemeClr val="lt1"/>
+          </a:fontRef>
+        </p:style>
+      </p:sp>
+      <p:sp>
+        <p:nvSpPr>
+          <p:cNvPr id="112" name="Retângulo 111">
+            <a:extLst>
+              <a:ext uri="{FF2B5EF4-FFF2-40B4-BE49-F238E27FC236}">
+                <a16:creationId xmlns:a16="http://schemas.microsoft.com/office/drawing/2014/main" xmlns="" id="{83B91B61-BFCA-4647-957E-A8269BE46F39}"/>
+              </a:ext>
+              <a:ext uri="{C183D7F6-B498-43B3-948B-1728B52AA6E4}">
+                <adec:decorative xmlns:adec="http://schemas.microsoft.com/office/drawing/2017/decorative" xmlns="" val="1"/>
+              </a:ext>
+            </a:extLst>
+          </p:cNvPr>
+          <p:cNvSpPr>
+            <a:spLocks noGrp="1" noRot="1" noChangeAspect="1" noMove="1" noResize="1" noEditPoints="1" noAdjustHandles="1" noChangeArrowheads="1" noChangeShapeType="1" noTextEdit="1"/>
+          </p:cNvSpPr>
+          <p:nvPr>
+            <p:extLst>
+              <p:ext uri="{386F3935-93C4-4BCD-93E2-E3B085C9AB24}">
+                <p16:designElem xmlns:p16="http://schemas.microsoft.com/office/powerpoint/2015/main" xmlns="" val="1"/>
+              </p:ext>
+            </p:extLst>
+          </p:nvPr>
+        </p:nvSpPr>
+        <p:spPr>
+          <a:xfrm>
+            <a:off x="0" y="0"/>
+            <a:ext cx="12192000" cy="6858000"/>
+          </a:xfrm>
+          <a:prstGeom prst="rect">
+            <a:avLst/>
+          </a:prstGeom>
+          <a:solidFill>
+            <a:schemeClr val="bg1"/>
+          </a:solidFill>
+          <a:ln>
+            <a:noFill/>
+          </a:ln>
+        </p:spPr>
+        <p:style>
+          <a:lnRef idx="2">
+            <a:schemeClr val="accent1">
+              <a:shade val="50000"/>
+            </a:schemeClr>
+          </a:lnRef>
+          <a:fillRef idx="1">
+            <a:schemeClr val="accent1"/>
+          </a:fillRef>
+          <a:effectRef idx="0">
+            <a:schemeClr val="accent1"/>
+          </a:effectRef>
+          <a:fontRef idx="minor">
+            <a:schemeClr val="lt1"/>
+          </a:fontRef>
+        </p:style>
+        <p:txBody>
+          <a:bodyPr rtlCol="0" anchor="ctr"/>
+          <a:lstStyle/>
+          <a:p>
+            <a:pPr algn="ctr" rtl="0"/>
+            <a:endParaRPr lang="pt-BR" u="sng" dirty="0"/>
+          </a:p>
+        </p:txBody>
+      </p:sp>
+      <p:sp>
+        <p:nvSpPr>
+          <p:cNvPr id="11" name="Retângulo 10">
+            <a:extLst>
+              <a:ext uri="{FF2B5EF4-FFF2-40B4-BE49-F238E27FC236}">
+                <a16:creationId xmlns:a16="http://schemas.microsoft.com/office/drawing/2014/main" xmlns="" id="{92D1D7C6-1C89-420C-8D35-483654167118}"/>
+              </a:ext>
+              <a:ext uri="{C183D7F6-B498-43B3-948B-1728B52AA6E4}">
+                <adec:decorative xmlns:adec="http://schemas.microsoft.com/office/drawing/2017/decorative" xmlns="" val="1"/>
+              </a:ext>
+            </a:extLst>
+          </p:cNvPr>
+          <p:cNvSpPr>
+            <a:spLocks noGrp="1" noRot="1" noChangeAspect="1" noMove="1" noResize="1" noEditPoints="1" noAdjustHandles="1" noChangeArrowheads="1" noChangeShapeType="1" noTextEdit="1"/>
+          </p:cNvSpPr>
+          <p:nvPr>
+            <p:extLst>
+              <p:ext uri="{386F3935-93C4-4BCD-93E2-E3B085C9AB24}">
+                <p16:designElem xmlns:p16="http://schemas.microsoft.com/office/powerpoint/2015/main" xmlns="" val="1"/>
+              </p:ext>
+            </p:extLst>
+          </p:nvPr>
+        </p:nvSpPr>
+        <p:spPr>
+          <a:xfrm>
+            <a:off x="4373545" y="376"/>
+            <a:ext cx="228600" cy="6858000"/>
+          </a:xfrm>
+          <a:prstGeom prst="rect">
+            <a:avLst/>
+          </a:prstGeom>
+          <a:solidFill>
+            <a:schemeClr val="tx2"/>
+          </a:solidFill>
+          <a:ln>
+            <a:noFill/>
+          </a:ln>
+        </p:spPr>
+        <p:style>
+          <a:lnRef idx="2">
+            <a:schemeClr val="accent1">
+              <a:shade val="50000"/>
+            </a:schemeClr>
+          </a:lnRef>
+          <a:fillRef idx="1">
+            <a:schemeClr val="accent1"/>
+          </a:fillRef>
+          <a:effectRef idx="0">
+            <a:schemeClr val="accent1"/>
+          </a:effectRef>
+          <a:fontRef idx="minor">
+            <a:schemeClr val="lt1"/>
+          </a:fontRef>
+        </p:style>
+      </p:sp>
+      <p:sp>
+        <p:nvSpPr>
+          <p:cNvPr id="13" name="Título 1">
+            <a:extLst>
+              <a:ext uri="{FF2B5EF4-FFF2-40B4-BE49-F238E27FC236}">
+                <a16:creationId xmlns:a16="http://schemas.microsoft.com/office/drawing/2014/main" xmlns="" id="{23F6D5E8-15CF-4755-910B-1B5A1E777357}"/>
+              </a:ext>
+            </a:extLst>
+          </p:cNvPr>
+          <p:cNvSpPr txBox="1">
+            <a:spLocks/>
+          </p:cNvSpPr>
+          <p:nvPr/>
+        </p:nvSpPr>
+        <p:spPr>
+          <a:xfrm>
+            <a:off x="4891375" y="416208"/>
+            <a:ext cx="7140203" cy="6273349"/>
           </a:xfrm>
           <a:prstGeom prst="rect">
             <a:avLst/>
@@ -6589,101 +7548,335 @@
               </a:lnSpc>
             </a:pPr>
             <a:r>
-              <a:rPr lang="pt-BR" sz="2800" dirty="0" smtClean="0"/>
-              <a:t>Inicialmente quando começamos um projeto, precisamos realizar diversas configurações da aplicação. Isso leva um tempo, dessa forma o Spring Boot vem para facilitar este processo. Com ele o projeto é criado com todas as configurações necessárias. Ajuda na performance do desenvolver e facilitar na hora do </a:t>
-            </a:r>
-            <a:r>
-              <a:rPr lang="pt-BR" sz="2800" dirty="0" err="1" smtClean="0"/>
-              <a:t>deploy</a:t>
-            </a:r>
-            <a:r>
-              <a:rPr lang="pt-BR" sz="2800" dirty="0" smtClean="0"/>
-              <a:t>.</a:t>
-            </a:r>
-            <a:endParaRPr lang="pt-BR" sz="2800" dirty="0"/>
-          </a:p>
-        </p:txBody>
-      </p:sp>
-      <p:sp>
-        <p:nvSpPr>
-          <p:cNvPr id="4" name="Retângulo 3"/>
-          <p:cNvSpPr/>
+              <a:rPr lang="pt-BR" sz="2400" dirty="0"/>
+              <a:t>A implementação é algo que pode ser executado em nossa aplicação</a:t>
+            </a:r>
+            <a:r>
+              <a:rPr lang="pt-BR" sz="2400" dirty="0" smtClean="0"/>
+              <a:t>. Qualquer </a:t>
+            </a:r>
+            <a:r>
+              <a:rPr lang="pt-BR" sz="2400" dirty="0"/>
+              <a:t>pessoa ou equipe pode escrever sua própria </a:t>
+            </a:r>
+            <a:r>
+              <a:rPr lang="pt-BR" sz="2400" dirty="0" smtClean="0"/>
+              <a:t>implementação da especificação </a:t>
+            </a:r>
+            <a:r>
+              <a:rPr lang="pt-BR" sz="2400" dirty="0" err="1"/>
+              <a:t>JPA.Dentre</a:t>
+            </a:r>
+            <a:r>
+              <a:rPr lang="pt-BR" sz="2400" dirty="0"/>
+              <a:t> as mais famosas temos o </a:t>
+            </a:r>
+            <a:r>
+              <a:rPr lang="pt-BR" sz="2400" dirty="0" err="1"/>
+              <a:t>OpenJPA</a:t>
+            </a:r>
+            <a:r>
+              <a:rPr lang="pt-BR" sz="2400" dirty="0"/>
+              <a:t> </a:t>
+            </a:r>
+            <a:r>
+              <a:rPr lang="pt-BR" sz="2400" dirty="0" smtClean="0"/>
+              <a:t>da </a:t>
+            </a:r>
+            <a:r>
+              <a:rPr lang="pt-BR" sz="2400" dirty="0"/>
+              <a:t>Apache, o </a:t>
+            </a:r>
+            <a:r>
+              <a:rPr lang="pt-BR" sz="2400" dirty="0" err="1"/>
+              <a:t>Hibernate</a:t>
+            </a:r>
+            <a:r>
+              <a:rPr lang="pt-BR" sz="2400" dirty="0"/>
+              <a:t> da </a:t>
+            </a:r>
+            <a:r>
+              <a:rPr lang="pt-BR" sz="2400" dirty="0" err="1"/>
+              <a:t>Red</a:t>
+            </a:r>
+            <a:r>
+              <a:rPr lang="pt-BR" sz="2400" dirty="0"/>
+              <a:t> </a:t>
+            </a:r>
+            <a:r>
+              <a:rPr lang="pt-BR" sz="2400" dirty="0" err="1"/>
+              <a:t>Hat</a:t>
+            </a:r>
+            <a:r>
+              <a:rPr lang="pt-BR" sz="2400" dirty="0"/>
+              <a:t> e o </a:t>
+            </a:r>
+            <a:r>
+              <a:rPr lang="pt-BR" sz="2400" dirty="0" err="1"/>
+              <a:t>EclipseLink</a:t>
+            </a:r>
+            <a:r>
+              <a:rPr lang="pt-BR" sz="2400" dirty="0"/>
+              <a:t> da Eclipse Foundation</a:t>
+            </a:r>
+            <a:r>
+              <a:rPr lang="pt-BR" sz="2400" dirty="0" smtClean="0"/>
+              <a:t>. As  mais </a:t>
+            </a:r>
+            <a:r>
+              <a:rPr lang="pt-BR" sz="2400" dirty="0"/>
+              <a:t>importantes são o </a:t>
+            </a:r>
+            <a:r>
+              <a:rPr lang="pt-BR" sz="2400" dirty="0" err="1"/>
+              <a:t>Hibernate</a:t>
+            </a:r>
+            <a:r>
+              <a:rPr lang="pt-BR" sz="2400" dirty="0"/>
+              <a:t>, por ainda ser a mais utilizada, e o</a:t>
+            </a:r>
+          </a:p>
+          <a:p>
+            <a:pPr>
+              <a:lnSpc>
+                <a:spcPct val="150000"/>
+              </a:lnSpc>
+            </a:pPr>
+            <a:r>
+              <a:rPr lang="pt-BR" sz="2400" dirty="0" err="1"/>
+              <a:t>EclipseLink</a:t>
+            </a:r>
+            <a:r>
+              <a:rPr lang="pt-BR" sz="2400" dirty="0"/>
+              <a:t>, por ser a implementação de referência.</a:t>
+            </a:r>
+          </a:p>
+          <a:p>
+            <a:pPr>
+              <a:lnSpc>
+                <a:spcPct val="150000"/>
+              </a:lnSpc>
+            </a:pPr>
+            <a:r>
+              <a:rPr lang="pt-BR" sz="2400" dirty="0" smtClean="0"/>
+              <a:t>A </a:t>
+            </a:r>
+            <a:r>
+              <a:rPr lang="pt-BR" sz="2400" dirty="0"/>
+              <a:t>grande ideia da especificação JPA é que a </a:t>
+            </a:r>
+            <a:r>
+              <a:rPr lang="pt-BR" sz="2400" dirty="0" smtClean="0"/>
+              <a:t>aplicação possa </a:t>
+            </a:r>
+            <a:r>
+              <a:rPr lang="pt-BR" sz="2400" dirty="0"/>
+              <a:t>trocar de implementação sem que precise de </a:t>
+            </a:r>
+            <a:r>
+              <a:rPr lang="pt-BR" sz="2400" dirty="0" smtClean="0"/>
+              <a:t>mudanças no </a:t>
+            </a:r>
+            <a:r>
+              <a:rPr lang="pt-BR" sz="2400" dirty="0"/>
+              <a:t>código. Apenas um pouco de configuração.</a:t>
+            </a:r>
+          </a:p>
+        </p:txBody>
+      </p:sp>
+      <p:sp>
+        <p:nvSpPr>
+          <p:cNvPr id="12" name="Título 1">
+            <a:extLst>
+              <a:ext uri="{FF2B5EF4-FFF2-40B4-BE49-F238E27FC236}">
+                <a16:creationId xmlns:a16="http://schemas.microsoft.com/office/drawing/2014/main" xmlns="" id="{23F6D5E8-15CF-4755-910B-1B5A1E777357}"/>
+              </a:ext>
+            </a:extLst>
+          </p:cNvPr>
+          <p:cNvSpPr>
+            <a:spLocks noGrp="1"/>
+          </p:cNvSpPr>
+          <p:nvPr>
+            <p:ph type="title"/>
+          </p:nvPr>
+        </p:nvSpPr>
+        <p:spPr>
+          <a:xfrm>
+            <a:off x="340377" y="993725"/>
+            <a:ext cx="3743937" cy="1422779"/>
+          </a:xfrm>
+        </p:spPr>
+        <p:txBody>
+          <a:bodyPr vert="horz" lIns="91440" tIns="45720" rIns="91440" bIns="45720" rtlCol="0" anchor="t">
+            <a:noAutofit/>
+          </a:bodyPr>
+          <a:lstStyle/>
+          <a:p>
+            <a:pPr rtl="0">
+              <a:lnSpc>
+                <a:spcPct val="100000"/>
+              </a:lnSpc>
+            </a:pPr>
+            <a:r>
+              <a:rPr lang="pt-BR" sz="4000" b="1" dirty="0" smtClean="0"/>
+              <a:t>Implementação</a:t>
+            </a:r>
+            <a:br>
+              <a:rPr lang="pt-BR" sz="4000" b="1" dirty="0" smtClean="0"/>
+            </a:br>
+            <a:r>
+              <a:rPr lang="pt-BR" sz="4000" b="1" dirty="0" smtClean="0"/>
+              <a:t>e especificação</a:t>
+            </a:r>
+            <a:endParaRPr lang="pt-BR" sz="4000" b="1" dirty="0"/>
+          </a:p>
+        </p:txBody>
+      </p:sp>
+      <p:sp>
+        <p:nvSpPr>
+          <p:cNvPr id="9" name="Título 1">
+            <a:extLst>
+              <a:ext uri="{FF2B5EF4-FFF2-40B4-BE49-F238E27FC236}">
+                <a16:creationId xmlns:a16="http://schemas.microsoft.com/office/drawing/2014/main" xmlns="" id="{23F6D5E8-15CF-4755-910B-1B5A1E777357}"/>
+              </a:ext>
+            </a:extLst>
+          </p:cNvPr>
+          <p:cNvSpPr txBox="1">
+            <a:spLocks/>
+          </p:cNvSpPr>
           <p:nvPr/>
         </p:nvSpPr>
         <p:spPr>
           <a:xfrm>
-            <a:off x="843547" y="2714184"/>
-            <a:ext cx="2327358" cy="2427498"/>
+            <a:off x="279464" y="2785984"/>
+            <a:ext cx="3743937" cy="2714803"/>
           </a:xfrm>
           <a:prstGeom prst="rect">
             <a:avLst/>
           </a:prstGeom>
-          <a:solidFill>
-            <a:srgbClr val="92D050"/>
-          </a:solidFill>
-          <a:ln>
-            <a:noFill/>
-          </a:ln>
-        </p:spPr>
-        <p:style>
-          <a:lnRef idx="2">
-            <a:schemeClr val="accent1">
-              <a:shade val="50000"/>
-            </a:schemeClr>
-          </a:lnRef>
-          <a:fillRef idx="1">
-            <a:schemeClr val="accent1"/>
-          </a:fillRef>
-          <a:effectRef idx="0">
-            <a:schemeClr val="accent1"/>
-          </a:effectRef>
-          <a:fontRef idx="minor">
-            <a:schemeClr val="lt1"/>
-          </a:fontRef>
-        </p:style>
-        <p:txBody>
-          <a:bodyPr rtlCol="0" anchor="ctr"/>
-          <a:lstStyle/>
-          <a:p>
-            <a:pPr algn="ctr"/>
-            <a:endParaRPr lang="pt-BR"/>
-          </a:p>
-        </p:txBody>
-      </p:sp>
-      <p:pic>
-        <p:nvPicPr>
-          <p:cNvPr id="3" name="Imagem 2"/>
-          <p:cNvPicPr>
-            <a:picLocks noChangeAspect="1"/>
-          </p:cNvPicPr>
-          <p:nvPr/>
-        </p:nvPicPr>
-        <p:blipFill>
-          <a:blip r:embed="rId3">
-            <a:extLst>
-              <a:ext uri="{28A0092B-C50C-407E-A947-70E740481C1C}">
-                <a14:useLocalDpi xmlns:a14="http://schemas.microsoft.com/office/drawing/2010/main" val="0"/>
-              </a:ext>
-            </a:extLst>
-          </a:blip>
-          <a:stretch>
-            <a:fillRect/>
-          </a:stretch>
-        </p:blipFill>
-        <p:spPr>
-          <a:xfrm>
-            <a:off x="684089" y="2573670"/>
-            <a:ext cx="2708526" cy="2708526"/>
-          </a:xfrm>
-          <a:prstGeom prst="rect">
-            <a:avLst/>
-          </a:prstGeom>
-        </p:spPr>
-      </p:pic>
+        </p:spPr>
+        <p:txBody>
+          <a:bodyPr vert="horz" lIns="91440" tIns="45720" rIns="91440" bIns="45720" rtlCol="0" anchor="t">
+            <a:noAutofit/>
+          </a:bodyPr>
+          <a:lstStyle>
+            <a:lvl1pPr algn="l" defTabSz="914400" rtl="0" eaLnBrk="1" latinLnBrk="0" hangingPunct="1">
+              <a:lnSpc>
+                <a:spcPct val="89000"/>
+              </a:lnSpc>
+              <a:spcBef>
+                <a:spcPct val="0"/>
+              </a:spcBef>
+              <a:buNone/>
+              <a:defRPr sz="4400" kern="1200" baseline="0">
+                <a:solidFill>
+                  <a:schemeClr val="tx2"/>
+                </a:solidFill>
+                <a:latin typeface="+mj-lt"/>
+                <a:ea typeface="+mj-ea"/>
+                <a:cs typeface="+mj-cs"/>
+              </a:defRPr>
+            </a:lvl1pPr>
+          </a:lstStyle>
+          <a:p>
+            <a:pPr>
+              <a:lnSpc>
+                <a:spcPct val="100000"/>
+              </a:lnSpc>
+            </a:pPr>
+            <a:r>
+              <a:rPr lang="pt-BR" sz="2000" dirty="0" smtClean="0"/>
+              <a:t>“A </a:t>
+            </a:r>
+            <a:r>
+              <a:rPr lang="pt-BR" sz="2000" b="1" dirty="0"/>
+              <a:t>implementação</a:t>
+            </a:r>
+            <a:r>
+              <a:rPr lang="pt-BR" sz="2000" dirty="0"/>
+              <a:t> é o </a:t>
+            </a:r>
+            <a:r>
+              <a:rPr lang="pt-BR" sz="2000" b="1" dirty="0"/>
+              <a:t>resultado aplicado </a:t>
+            </a:r>
+            <a:r>
+              <a:rPr lang="pt-BR" sz="2000" dirty="0"/>
+              <a:t>(concreto) de </a:t>
+            </a:r>
+            <a:r>
+              <a:rPr lang="pt-BR" sz="2000" dirty="0" smtClean="0"/>
+              <a:t>uma especificação</a:t>
+            </a:r>
+            <a:r>
+              <a:rPr lang="pt-BR" sz="2000" dirty="0"/>
+              <a:t>, </a:t>
+            </a:r>
+            <a:r>
+              <a:rPr lang="pt-BR" sz="2000" b="1" dirty="0"/>
+              <a:t>por motivos técnicos</a:t>
+            </a:r>
+            <a:r>
+              <a:rPr lang="pt-BR" sz="2000" dirty="0"/>
+              <a:t>, de desempenho ou de</a:t>
+            </a:r>
+          </a:p>
+          <a:p>
+            <a:pPr>
+              <a:lnSpc>
+                <a:spcPct val="100000"/>
+              </a:lnSpc>
+            </a:pPr>
+            <a:r>
+              <a:rPr lang="pt-BR" sz="2000" dirty="0"/>
+              <a:t>utilização a implementação </a:t>
+            </a:r>
+            <a:r>
+              <a:rPr lang="pt-BR" sz="2000" b="1" dirty="0"/>
+              <a:t>pode</a:t>
+            </a:r>
+            <a:r>
+              <a:rPr lang="pt-BR" sz="2000" dirty="0"/>
+              <a:t> </a:t>
+            </a:r>
+            <a:r>
+              <a:rPr lang="pt-BR" sz="2000" b="1" dirty="0"/>
+              <a:t>ser </a:t>
+            </a:r>
+            <a:r>
+              <a:rPr lang="pt-BR" sz="2000" dirty="0"/>
+              <a:t>totalmente </a:t>
+            </a:r>
+            <a:r>
+              <a:rPr lang="pt-BR" sz="2000" b="1" dirty="0"/>
+              <a:t>diferente</a:t>
+            </a:r>
+          </a:p>
+          <a:p>
+            <a:pPr>
+              <a:lnSpc>
+                <a:spcPct val="100000"/>
+              </a:lnSpc>
+            </a:pPr>
+            <a:r>
+              <a:rPr lang="pt-BR" sz="2000" dirty="0"/>
+              <a:t>da </a:t>
+            </a:r>
+            <a:r>
+              <a:rPr lang="pt-BR" sz="2000" b="1" dirty="0"/>
+              <a:t>especificação</a:t>
+            </a:r>
+            <a:r>
+              <a:rPr lang="pt-BR" sz="2000" dirty="0"/>
+              <a:t>.”</a:t>
+            </a:r>
+          </a:p>
+        </p:txBody>
+      </p:sp>
     </p:spTree>
     <p:extLst>
       <p:ext uri="{BB962C8B-B14F-4D97-AF65-F5344CB8AC3E}">
-        <p14:creationId xmlns:p14="http://schemas.microsoft.com/office/powerpoint/2010/main" val="3500495708"/>
+        <p14:creationId xmlns:p14="http://schemas.microsoft.com/office/powerpoint/2010/main" val="1977505609"/>
       </p:ext>
     </p:extLst>
   </p:cSld>
@@ -6700,7 +7893,7 @@
 </p:sld>
 </file>
 
-<file path=ppt/slides/slide6.xml><?xml version="1.0" encoding="utf-8"?>
+<file path=ppt/slides/slide8.xml><?xml version="1.0" encoding="utf-8"?>
 <p:sld xmlns:a="http://schemas.openxmlformats.org/drawingml/2006/main" xmlns:r="http://schemas.openxmlformats.org/officeDocument/2006/relationships" xmlns:p="http://schemas.openxmlformats.org/presentationml/2006/main">
   <p:cSld>
     <p:bg>
@@ -7054,13 +8247,26 @@
           <a:p>
             <a:pPr rtl="0"/>
             <a:r>
-              <a:rPr lang="pt-BR">
+              <a:rPr lang="pt-BR" dirty="0" err="1" smtClean="0">
                 <a:solidFill>
                   <a:schemeClr val="bg2"/>
                 </a:solidFill>
               </a:rPr>
-              <a:t>nome@example.com</a:t>
-            </a:r>
+              <a:t>Franceli</a:t>
+            </a:r>
+            <a:r>
+              <a:rPr lang="pt-BR" dirty="0" smtClean="0">
+                <a:solidFill>
+                  <a:schemeClr val="bg2"/>
+                </a:solidFill>
+              </a:rPr>
+              <a:t> Abreu</a:t>
+            </a:r>
+            <a:endParaRPr lang="pt-BR" dirty="0">
+              <a:solidFill>
+                <a:schemeClr val="bg2"/>
+              </a:solidFill>
+            </a:endParaRPr>
           </a:p>
         </p:txBody>
       </p:sp>

</xml_diff>